<commit_message>
Fixed top-down to bottom-up
</commit_message>
<xml_diff>
--- a/Final Project PPT.pptx
+++ b/Final Project PPT.pptx
@@ -23,28 +23,28 @@
   <p:notesSz cx="6858000" cy="9144000"/>
   <p:embeddedFontLst>
     <p:embeddedFont>
-      <p:font typeface="Titillium Web" panose="020B0604020202020204" charset="0"/>
+      <p:font typeface="Economica" panose="020B0604020202020204" charset="0"/>
       <p:regular r:id="rId13"/>
       <p:bold r:id="rId14"/>
       <p:italic r:id="rId15"/>
       <p:boldItalic r:id="rId16"/>
     </p:embeddedFont>
     <p:embeddedFont>
-      <p:font typeface="Spectral" panose="020B0604020202020204" charset="0"/>
+      <p:font typeface="Open Sans" panose="020B0604020202020204" charset="0"/>
       <p:regular r:id="rId17"/>
       <p:bold r:id="rId18"/>
       <p:italic r:id="rId19"/>
       <p:boldItalic r:id="rId20"/>
     </p:embeddedFont>
     <p:embeddedFont>
-      <p:font typeface="Economica" panose="020B0604020202020204" charset="0"/>
+      <p:font typeface="Spectral" panose="020B0604020202020204" charset="0"/>
       <p:regular r:id="rId21"/>
       <p:bold r:id="rId22"/>
       <p:italic r:id="rId23"/>
       <p:boldItalic r:id="rId24"/>
     </p:embeddedFont>
     <p:embeddedFont>
-      <p:font typeface="Open Sans" panose="020B0604020202020204" charset="0"/>
+      <p:font typeface="Titillium Web" panose="020B0604020202020204" charset="0"/>
       <p:regular r:id="rId25"/>
       <p:bold r:id="rId26"/>
       <p:italic r:id="rId27"/>
@@ -7865,7 +7865,7 @@
               <a:buSzPts val="2200"/>
             </a:pPr>
             <a:r>
-              <a:rPr lang="en" sz="2200" baseline="30000" dirty="0" smtClean="0">
+              <a:rPr lang="en" sz="2200" baseline="30000" dirty="0">
                 <a:solidFill>
                   <a:srgbClr val="0C343D"/>
                 </a:solidFill>
@@ -7874,7 +7874,19 @@
                 <a:cs typeface="Titillium Web"/>
                 <a:sym typeface="Titillium Web"/>
               </a:rPr>
-              <a:t>Alifio </a:t>
+              <a:t>Alifio Rasendriya Rasyid</a:t>
+            </a:r>
+            <a:r>
+              <a:rPr lang="en" sz="2200" dirty="0">
+                <a:solidFill>
+                  <a:srgbClr val="0C343D"/>
+                </a:solidFill>
+                <a:latin typeface="Titillium Web"/>
+                <a:ea typeface="Titillium Web"/>
+                <a:cs typeface="Titillium Web"/>
+                <a:sym typeface="Titillium Web"/>
+              </a:rPr>
+              <a:t> </a:t>
             </a:r>
             <a:r>
               <a:rPr lang="en" sz="2200" baseline="30000" dirty="0">
@@ -7886,53 +7898,8 @@
                 <a:cs typeface="Titillium Web"/>
                 <a:sym typeface="Titillium Web"/>
               </a:rPr>
-              <a:t>Rasendriya </a:t>
-            </a:r>
-            <a:r>
-              <a:rPr lang="en" sz="2200" baseline="30000" dirty="0" smtClean="0">
-                <a:solidFill>
-                  <a:srgbClr val="0C343D"/>
-                </a:solidFill>
-                <a:latin typeface="Titillium Web"/>
-                <a:ea typeface="Titillium Web"/>
-                <a:cs typeface="Titillium Web"/>
-                <a:sym typeface="Titillium Web"/>
-              </a:rPr>
-              <a:t>Rasyid</a:t>
-            </a:r>
-            <a:r>
-              <a:rPr lang="en" sz="2200" dirty="0" smtClean="0">
-                <a:solidFill>
-                  <a:srgbClr val="0C343D"/>
-                </a:solidFill>
-                <a:latin typeface="Titillium Web"/>
-                <a:ea typeface="Titillium Web"/>
-                <a:cs typeface="Titillium Web"/>
-                <a:sym typeface="Titillium Web"/>
-              </a:rPr>
-              <a:t> </a:t>
-            </a:r>
-            <a:r>
-              <a:rPr lang="en" sz="2200" baseline="30000" dirty="0" smtClean="0">
-                <a:solidFill>
-                  <a:srgbClr val="0C343D"/>
-                </a:solidFill>
-                <a:latin typeface="Titillium Web"/>
-                <a:ea typeface="Titillium Web"/>
-                <a:cs typeface="Titillium Web"/>
-                <a:sym typeface="Titillium Web"/>
-              </a:rPr>
               <a:t>(2201798295)</a:t>
             </a:r>
-            <a:endParaRPr lang="en" sz="2200" baseline="30000" dirty="0">
-              <a:solidFill>
-                <a:srgbClr val="0C343D"/>
-              </a:solidFill>
-              <a:latin typeface="Titillium Web"/>
-              <a:ea typeface="Titillium Web"/>
-              <a:cs typeface="Titillium Web"/>
-              <a:sym typeface="Titillium Web"/>
-            </a:endParaRPr>
           </a:p>
           <a:p>
             <a:pPr marL="88900" lvl="0" indent="0" algn="l" rtl="0">
@@ -7951,7 +7918,7 @@
               <a:buSzPts val="2200"/>
             </a:pPr>
             <a:r>
-              <a:rPr lang="en" sz="2200" baseline="30000" dirty="0" smtClean="0">
+              <a:rPr lang="en" sz="2200" baseline="30000" dirty="0">
                 <a:solidFill>
                   <a:srgbClr val="0C343D"/>
                 </a:solidFill>
@@ -7962,15 +7929,6 @@
               </a:rPr>
               <a:t>Jason Sianandar (2201796440)</a:t>
             </a:r>
-            <a:endParaRPr lang="en" sz="2200" baseline="30000" dirty="0">
-              <a:solidFill>
-                <a:srgbClr val="0C343D"/>
-              </a:solidFill>
-              <a:latin typeface="Titillium Web"/>
-              <a:ea typeface="Titillium Web"/>
-              <a:cs typeface="Titillium Web"/>
-              <a:sym typeface="Titillium Web"/>
-            </a:endParaRPr>
           </a:p>
           <a:p>
             <a:pPr marL="88900" lvl="0" indent="0" algn="l" rtl="0">
@@ -7988,18 +7946,6 @@
               </a:buClr>
               <a:buSzPts val="2200"/>
             </a:pPr>
-            <a:r>
-              <a:rPr lang="en" sz="2200" baseline="30000" dirty="0" smtClean="0">
-                <a:solidFill>
-                  <a:srgbClr val="0C343D"/>
-                </a:solidFill>
-                <a:latin typeface="Titillium Web"/>
-                <a:ea typeface="Titillium Web"/>
-                <a:cs typeface="Titillium Web"/>
-                <a:sym typeface="Titillium Web"/>
-              </a:rPr>
-              <a:t>Muchsin </a:t>
-            </a:r>
             <a:r>
               <a:rPr lang="en" sz="2200" baseline="30000" dirty="0">
                 <a:solidFill>
@@ -8010,29 +7956,8 @@
                 <a:cs typeface="Titillium Web"/>
                 <a:sym typeface="Titillium Web"/>
               </a:rPr>
-              <a:t>Hisyam </a:t>
+              <a:t>Muchsin Hisyam (2201797430)</a:t>
             </a:r>
-            <a:r>
-              <a:rPr lang="en" sz="2200" baseline="30000" dirty="0" smtClean="0">
-                <a:solidFill>
-                  <a:srgbClr val="0C343D"/>
-                </a:solidFill>
-                <a:latin typeface="Titillium Web"/>
-                <a:ea typeface="Titillium Web"/>
-                <a:cs typeface="Titillium Web"/>
-                <a:sym typeface="Titillium Web"/>
-              </a:rPr>
-              <a:t>(2201797430)</a:t>
-            </a:r>
-            <a:endParaRPr lang="en" sz="2200" baseline="30000" dirty="0">
-              <a:solidFill>
-                <a:srgbClr val="0C343D"/>
-              </a:solidFill>
-              <a:latin typeface="Titillium Web"/>
-              <a:ea typeface="Titillium Web"/>
-              <a:cs typeface="Titillium Web"/>
-              <a:sym typeface="Titillium Web"/>
-            </a:endParaRPr>
           </a:p>
           <a:p>
             <a:pPr marL="88900" lvl="0" indent="0" algn="l" rtl="0">
@@ -8050,18 +7975,6 @@
               </a:buClr>
               <a:buSzPts val="2200"/>
             </a:pPr>
-            <a:r>
-              <a:rPr lang="en" sz="2200" baseline="30000" dirty="0" smtClean="0">
-                <a:solidFill>
-                  <a:srgbClr val="0C343D"/>
-                </a:solidFill>
-                <a:latin typeface="Titillium Web"/>
-                <a:ea typeface="Titillium Web"/>
-                <a:cs typeface="Titillium Web"/>
-                <a:sym typeface="Titillium Web"/>
-              </a:rPr>
-              <a:t>Nicholas </a:t>
-            </a:r>
             <a:r>
               <a:rPr lang="en" sz="2200" baseline="30000" dirty="0">
                 <a:solidFill>
@@ -8072,19 +7985,7 @@
                 <a:cs typeface="Titillium Web"/>
                 <a:sym typeface="Titillium Web"/>
               </a:rPr>
-              <a:t>Michael </a:t>
-            </a:r>
-            <a:r>
-              <a:rPr lang="en" sz="2200" baseline="30000" dirty="0" smtClean="0">
-                <a:solidFill>
-                  <a:srgbClr val="0C343D"/>
-                </a:solidFill>
-                <a:latin typeface="Titillium Web"/>
-                <a:ea typeface="Titillium Web"/>
-                <a:cs typeface="Titillium Web"/>
-                <a:sym typeface="Titillium Web"/>
-              </a:rPr>
-              <a:t>Halim (2201798761)</a:t>
+              <a:t>Nicholas Michael Halim (2201798761)</a:t>
             </a:r>
             <a:endParaRPr sz="2200" baseline="30000" dirty="0">
               <a:solidFill>
@@ -8633,7 +8534,43 @@
                 <a:cs typeface="Titillium Web"/>
                 <a:sym typeface="Titillium Web"/>
               </a:rPr>
-              <a:t>We then implement our own method of natural language processing (NLP), by parsing the commands given by the user based on key command-words and key object-words. Because of a simpler set of commands, we may be able to parse the commands using a top-down approach.</a:t>
+              <a:t>We then implement our own method of natural language processing (NLP), by parsing the commands given by the user based on key command-words and key object-words. Because of a simpler set of commands, we may be able to parse the commands using a </a:t>
+            </a:r>
+            <a:r>
+              <a:rPr lang="en-US" dirty="0">
+                <a:solidFill>
+                  <a:srgbClr val="215D77"/>
+                </a:solidFill>
+                <a:latin typeface="Titillium Web"/>
+                <a:ea typeface="Titillium Web"/>
+                <a:cs typeface="Titillium Web"/>
+                <a:sym typeface="Titillium Web"/>
+              </a:rPr>
+              <a:t>bottom-up</a:t>
+            </a:r>
+            <a:r>
+              <a:rPr lang="en">
+                <a:solidFill>
+                  <a:srgbClr val="215D77"/>
+                </a:solidFill>
+                <a:latin typeface="Titillium Web"/>
+                <a:ea typeface="Titillium Web"/>
+                <a:cs typeface="Titillium Web"/>
+                <a:sym typeface="Titillium Web"/>
+              </a:rPr>
+              <a:t> </a:t>
+            </a:r>
+            <a:r>
+              <a:rPr lang="en" dirty="0">
+                <a:solidFill>
+                  <a:srgbClr val="215D77"/>
+                </a:solidFill>
+                <a:latin typeface="Titillium Web"/>
+                <a:ea typeface="Titillium Web"/>
+                <a:cs typeface="Titillium Web"/>
+                <a:sym typeface="Titillium Web"/>
+              </a:rPr>
+              <a:t>approach.</a:t>
             </a:r>
             <a:endParaRPr dirty="0">
               <a:solidFill>
@@ -8673,19 +8610,7 @@
                 <a:cs typeface="Titillium Web"/>
                 <a:sym typeface="Titillium Web"/>
               </a:rPr>
-              <a:t>Concept similar to </a:t>
-            </a:r>
-            <a:r>
-              <a:rPr lang="en" dirty="0" smtClean="0">
-                <a:solidFill>
-                  <a:srgbClr val="215D77"/>
-                </a:solidFill>
-                <a:latin typeface="Titillium Web"/>
-                <a:ea typeface="Titillium Web"/>
-                <a:cs typeface="Titillium Web"/>
-                <a:sym typeface="Titillium Web"/>
-              </a:rPr>
-              <a:t>CFG</a:t>
+              <a:t>Concept similar to CFG</a:t>
             </a:r>
             <a:endParaRPr dirty="0">
               <a:solidFill>

</xml_diff>